<commit_message>
write chapter 13:commit by multi user
</commit_message>
<xml_diff>
--- a/pptx/chapter-13.pptx
+++ b/pptx/chapter-13.pptx
@@ -8,6 +8,12 @@
     <p:sldId id="261" r:id="rId2"/>
     <p:sldId id="262" r:id="rId3"/>
     <p:sldId id="263" r:id="rId4"/>
+    <p:sldId id="264" r:id="rId5"/>
+    <p:sldId id="265" r:id="rId6"/>
+    <p:sldId id="266" r:id="rId7"/>
+    <p:sldId id="267" r:id="rId8"/>
+    <p:sldId id="268" r:id="rId9"/>
+    <p:sldId id="269" r:id="rId10"/>
   </p:sldIdLst>
   <p:sldSz cx="9144000" cy="6858000" type="screen4x3"/>
   <p:notesSz cx="6858000" cy="9144000"/>
@@ -245,7 +251,7 @@
           <a:p>
             <a:fld id="{07DD73A8-177D-4FF7-AF69-632B85FAD23A}" type="datetimeFigureOut">
               <a:rPr kumimoji="1" lang="ja-JP" altLang="en-US" smtClean="0"/>
-              <a:t>2013/12/9</a:t>
+              <a:t>2013/12/10</a:t>
             </a:fld>
             <a:endParaRPr kumimoji="1" lang="ja-JP" altLang="en-US"/>
           </a:p>
@@ -447,7 +453,7 @@
           <a:p>
             <a:fld id="{07DD73A8-177D-4FF7-AF69-632B85FAD23A}" type="datetimeFigureOut">
               <a:rPr kumimoji="1" lang="ja-JP" altLang="en-US" smtClean="0"/>
-              <a:t>2013/12/9</a:t>
+              <a:t>2013/12/10</a:t>
             </a:fld>
             <a:endParaRPr kumimoji="1" lang="ja-JP" altLang="en-US"/>
           </a:p>
@@ -659,7 +665,7 @@
           <a:p>
             <a:fld id="{07DD73A8-177D-4FF7-AF69-632B85FAD23A}" type="datetimeFigureOut">
               <a:rPr kumimoji="1" lang="ja-JP" altLang="en-US" smtClean="0"/>
-              <a:t>2013/12/9</a:t>
+              <a:t>2013/12/10</a:t>
             </a:fld>
             <a:endParaRPr kumimoji="1" lang="ja-JP" altLang="en-US"/>
           </a:p>
@@ -861,7 +867,7 @@
           <a:p>
             <a:fld id="{07DD73A8-177D-4FF7-AF69-632B85FAD23A}" type="datetimeFigureOut">
               <a:rPr kumimoji="1" lang="ja-JP" altLang="en-US" smtClean="0"/>
-              <a:t>2013/12/9</a:t>
+              <a:t>2013/12/10</a:t>
             </a:fld>
             <a:endParaRPr kumimoji="1" lang="ja-JP" altLang="en-US"/>
           </a:p>
@@ -1105,7 +1111,7 @@
           <a:p>
             <a:fld id="{07DD73A8-177D-4FF7-AF69-632B85FAD23A}" type="datetimeFigureOut">
               <a:rPr kumimoji="1" lang="ja-JP" altLang="en-US" smtClean="0"/>
-              <a:t>2013/12/9</a:t>
+              <a:t>2013/12/10</a:t>
             </a:fld>
             <a:endParaRPr kumimoji="1" lang="ja-JP" altLang="en-US"/>
           </a:p>
@@ -1401,7 +1407,7 @@
           <a:p>
             <a:fld id="{07DD73A8-177D-4FF7-AF69-632B85FAD23A}" type="datetimeFigureOut">
               <a:rPr kumimoji="1" lang="ja-JP" altLang="en-US" smtClean="0"/>
-              <a:t>2013/12/9</a:t>
+              <a:t>2013/12/10</a:t>
             </a:fld>
             <a:endParaRPr kumimoji="1" lang="ja-JP" altLang="en-US"/>
           </a:p>
@@ -1832,7 +1838,7 @@
           <a:p>
             <a:fld id="{07DD73A8-177D-4FF7-AF69-632B85FAD23A}" type="datetimeFigureOut">
               <a:rPr kumimoji="1" lang="ja-JP" altLang="en-US" smtClean="0"/>
-              <a:t>2013/12/9</a:t>
+              <a:t>2013/12/10</a:t>
             </a:fld>
             <a:endParaRPr kumimoji="1" lang="ja-JP" altLang="en-US"/>
           </a:p>
@@ -1950,7 +1956,7 @@
           <a:p>
             <a:fld id="{07DD73A8-177D-4FF7-AF69-632B85FAD23A}" type="datetimeFigureOut">
               <a:rPr kumimoji="1" lang="ja-JP" altLang="en-US" smtClean="0"/>
-              <a:t>2013/12/9</a:t>
+              <a:t>2013/12/10</a:t>
             </a:fld>
             <a:endParaRPr kumimoji="1" lang="ja-JP" altLang="en-US"/>
           </a:p>
@@ -2045,7 +2051,7 @@
           <a:p>
             <a:fld id="{07DD73A8-177D-4FF7-AF69-632B85FAD23A}" type="datetimeFigureOut">
               <a:rPr kumimoji="1" lang="ja-JP" altLang="en-US" smtClean="0"/>
-              <a:t>2013/12/9</a:t>
+              <a:t>2013/12/10</a:t>
             </a:fld>
             <a:endParaRPr kumimoji="1" lang="ja-JP" altLang="en-US"/>
           </a:p>
@@ -2354,7 +2360,7 @@
           <a:p>
             <a:fld id="{07DD73A8-177D-4FF7-AF69-632B85FAD23A}" type="datetimeFigureOut">
               <a:rPr kumimoji="1" lang="ja-JP" altLang="en-US" smtClean="0"/>
-              <a:t>2013/12/9</a:t>
+              <a:t>2013/12/10</a:t>
             </a:fld>
             <a:endParaRPr kumimoji="1" lang="ja-JP" altLang="en-US"/>
           </a:p>
@@ -2611,7 +2617,7 @@
           <a:p>
             <a:fld id="{07DD73A8-177D-4FF7-AF69-632B85FAD23A}" type="datetimeFigureOut">
               <a:rPr kumimoji="1" lang="ja-JP" altLang="en-US" smtClean="0"/>
-              <a:t>2013/12/9</a:t>
+              <a:t>2013/12/10</a:t>
             </a:fld>
             <a:endParaRPr kumimoji="1" lang="ja-JP" altLang="en-US"/>
           </a:p>
@@ -2856,7 +2862,7 @@
           <a:p>
             <a:fld id="{07DD73A8-177D-4FF7-AF69-632B85FAD23A}" type="datetimeFigureOut">
               <a:rPr kumimoji="1" lang="ja-JP" altLang="en-US" smtClean="0"/>
-              <a:t>2013/12/9</a:t>
+              <a:t>2013/12/10</a:t>
             </a:fld>
             <a:endParaRPr kumimoji="1" lang="ja-JP" altLang="en-US"/>
           </a:p>
@@ -4631,6 +4637,330 @@
 </p:sld>
 </file>
 
+<file path=ppt/slides/slide4.xml><?xml version="1.0" encoding="utf-8"?>
+<p:sld xmlns:a="http://schemas.openxmlformats.org/drawingml/2006/main" xmlns:r="http://schemas.openxmlformats.org/officeDocument/2006/relationships" xmlns:p="http://schemas.openxmlformats.org/presentationml/2006/main">
+  <p:cSld>
+    <p:spTree>
+      <p:nvGrpSpPr>
+        <p:cNvPr id="1" name=""/>
+        <p:cNvGrpSpPr/>
+        <p:nvPr/>
+      </p:nvGrpSpPr>
+      <p:grpSpPr>
+        <a:xfrm>
+          <a:off x="0" y="0"/>
+          <a:ext cx="0" cy="0"/>
+          <a:chOff x="0" y="0"/>
+          <a:chExt cx="0" cy="0"/>
+        </a:xfrm>
+      </p:grpSpPr>
+      <p:pic>
+        <p:nvPicPr>
+          <p:cNvPr id="3" name="図 2"/>
+          <p:cNvPicPr>
+            <a:picLocks noChangeAspect="1"/>
+          </p:cNvPicPr>
+          <p:nvPr/>
+        </p:nvPicPr>
+        <p:blipFill>
+          <a:blip r:embed="rId2"/>
+          <a:stretch>
+            <a:fillRect/>
+          </a:stretch>
+        </p:blipFill>
+        <p:spPr>
+          <a:xfrm>
+            <a:off x="1528762" y="1090612"/>
+            <a:ext cx="6086475" cy="4676775"/>
+          </a:xfrm>
+          <a:prstGeom prst="rect">
+            <a:avLst/>
+          </a:prstGeom>
+        </p:spPr>
+      </p:pic>
+    </p:spTree>
+    <p:extLst>
+      <p:ext uri="{BB962C8B-B14F-4D97-AF65-F5344CB8AC3E}">
+        <p14:creationId xmlns:p14="http://schemas.microsoft.com/office/powerpoint/2010/main" val="3516370559"/>
+      </p:ext>
+    </p:extLst>
+  </p:cSld>
+  <p:clrMapOvr>
+    <a:masterClrMapping/>
+  </p:clrMapOvr>
+</p:sld>
+</file>
+
+<file path=ppt/slides/slide5.xml><?xml version="1.0" encoding="utf-8"?>
+<p:sld xmlns:a="http://schemas.openxmlformats.org/drawingml/2006/main" xmlns:r="http://schemas.openxmlformats.org/officeDocument/2006/relationships" xmlns:p="http://schemas.openxmlformats.org/presentationml/2006/main">
+  <p:cSld>
+    <p:spTree>
+      <p:nvGrpSpPr>
+        <p:cNvPr id="1" name=""/>
+        <p:cNvGrpSpPr/>
+        <p:nvPr/>
+      </p:nvGrpSpPr>
+      <p:grpSpPr>
+        <a:xfrm>
+          <a:off x="0" y="0"/>
+          <a:ext cx="0" cy="0"/>
+          <a:chOff x="0" y="0"/>
+          <a:chExt cx="0" cy="0"/>
+        </a:xfrm>
+      </p:grpSpPr>
+      <p:pic>
+        <p:nvPicPr>
+          <p:cNvPr id="2" name="図 1"/>
+          <p:cNvPicPr>
+            <a:picLocks noChangeAspect="1"/>
+          </p:cNvPicPr>
+          <p:nvPr/>
+        </p:nvPicPr>
+        <p:blipFill>
+          <a:blip r:embed="rId2"/>
+          <a:stretch>
+            <a:fillRect/>
+          </a:stretch>
+        </p:blipFill>
+        <p:spPr>
+          <a:xfrm>
+            <a:off x="2343150" y="1585912"/>
+            <a:ext cx="4457700" cy="3686175"/>
+          </a:xfrm>
+          <a:prstGeom prst="rect">
+            <a:avLst/>
+          </a:prstGeom>
+        </p:spPr>
+      </p:pic>
+    </p:spTree>
+    <p:extLst>
+      <p:ext uri="{BB962C8B-B14F-4D97-AF65-F5344CB8AC3E}">
+        <p14:creationId xmlns:p14="http://schemas.microsoft.com/office/powerpoint/2010/main" val="3842423103"/>
+      </p:ext>
+    </p:extLst>
+  </p:cSld>
+  <p:clrMapOvr>
+    <a:masterClrMapping/>
+  </p:clrMapOvr>
+</p:sld>
+</file>
+
+<file path=ppt/slides/slide6.xml><?xml version="1.0" encoding="utf-8"?>
+<p:sld xmlns:a="http://schemas.openxmlformats.org/drawingml/2006/main" xmlns:r="http://schemas.openxmlformats.org/officeDocument/2006/relationships" xmlns:p="http://schemas.openxmlformats.org/presentationml/2006/main">
+  <p:cSld>
+    <p:spTree>
+      <p:nvGrpSpPr>
+        <p:cNvPr id="1" name=""/>
+        <p:cNvGrpSpPr/>
+        <p:nvPr/>
+      </p:nvGrpSpPr>
+      <p:grpSpPr>
+        <a:xfrm>
+          <a:off x="0" y="0"/>
+          <a:ext cx="0" cy="0"/>
+          <a:chOff x="0" y="0"/>
+          <a:chExt cx="0" cy="0"/>
+        </a:xfrm>
+      </p:grpSpPr>
+      <p:pic>
+        <p:nvPicPr>
+          <p:cNvPr id="2" name="図 1"/>
+          <p:cNvPicPr>
+            <a:picLocks noChangeAspect="1"/>
+          </p:cNvPicPr>
+          <p:nvPr/>
+        </p:nvPicPr>
+        <p:blipFill>
+          <a:blip r:embed="rId2"/>
+          <a:stretch>
+            <a:fillRect/>
+          </a:stretch>
+        </p:blipFill>
+        <p:spPr>
+          <a:xfrm>
+            <a:off x="1395412" y="1971675"/>
+            <a:ext cx="6353175" cy="2914650"/>
+          </a:xfrm>
+          <a:prstGeom prst="rect">
+            <a:avLst/>
+          </a:prstGeom>
+        </p:spPr>
+      </p:pic>
+    </p:spTree>
+    <p:extLst>
+      <p:ext uri="{BB962C8B-B14F-4D97-AF65-F5344CB8AC3E}">
+        <p14:creationId xmlns:p14="http://schemas.microsoft.com/office/powerpoint/2010/main" val="2754473337"/>
+      </p:ext>
+    </p:extLst>
+  </p:cSld>
+  <p:clrMapOvr>
+    <a:masterClrMapping/>
+  </p:clrMapOvr>
+</p:sld>
+</file>
+
+<file path=ppt/slides/slide7.xml><?xml version="1.0" encoding="utf-8"?>
+<p:sld xmlns:a="http://schemas.openxmlformats.org/drawingml/2006/main" xmlns:r="http://schemas.openxmlformats.org/officeDocument/2006/relationships" xmlns:p="http://schemas.openxmlformats.org/presentationml/2006/main">
+  <p:cSld>
+    <p:spTree>
+      <p:nvGrpSpPr>
+        <p:cNvPr id="1" name=""/>
+        <p:cNvGrpSpPr/>
+        <p:nvPr/>
+      </p:nvGrpSpPr>
+      <p:grpSpPr>
+        <a:xfrm>
+          <a:off x="0" y="0"/>
+          <a:ext cx="0" cy="0"/>
+          <a:chOff x="0" y="0"/>
+          <a:chExt cx="0" cy="0"/>
+        </a:xfrm>
+      </p:grpSpPr>
+      <p:pic>
+        <p:nvPicPr>
+          <p:cNvPr id="2" name="図 1"/>
+          <p:cNvPicPr>
+            <a:picLocks noChangeAspect="1"/>
+          </p:cNvPicPr>
+          <p:nvPr/>
+        </p:nvPicPr>
+        <p:blipFill>
+          <a:blip r:embed="rId2"/>
+          <a:stretch>
+            <a:fillRect/>
+          </a:stretch>
+        </p:blipFill>
+        <p:spPr>
+          <a:xfrm>
+            <a:off x="1704975" y="1257300"/>
+            <a:ext cx="5734050" cy="4343400"/>
+          </a:xfrm>
+          <a:prstGeom prst="rect">
+            <a:avLst/>
+          </a:prstGeom>
+        </p:spPr>
+      </p:pic>
+    </p:spTree>
+    <p:extLst>
+      <p:ext uri="{BB962C8B-B14F-4D97-AF65-F5344CB8AC3E}">
+        <p14:creationId xmlns:p14="http://schemas.microsoft.com/office/powerpoint/2010/main" val="42371895"/>
+      </p:ext>
+    </p:extLst>
+  </p:cSld>
+  <p:clrMapOvr>
+    <a:masterClrMapping/>
+  </p:clrMapOvr>
+</p:sld>
+</file>
+
+<file path=ppt/slides/slide8.xml><?xml version="1.0" encoding="utf-8"?>
+<p:sld xmlns:a="http://schemas.openxmlformats.org/drawingml/2006/main" xmlns:r="http://schemas.openxmlformats.org/officeDocument/2006/relationships" xmlns:p="http://schemas.openxmlformats.org/presentationml/2006/main">
+  <p:cSld>
+    <p:spTree>
+      <p:nvGrpSpPr>
+        <p:cNvPr id="1" name=""/>
+        <p:cNvGrpSpPr/>
+        <p:nvPr/>
+      </p:nvGrpSpPr>
+      <p:grpSpPr>
+        <a:xfrm>
+          <a:off x="0" y="0"/>
+          <a:ext cx="0" cy="0"/>
+          <a:chOff x="0" y="0"/>
+          <a:chExt cx="0" cy="0"/>
+        </a:xfrm>
+      </p:grpSpPr>
+      <p:pic>
+        <p:nvPicPr>
+          <p:cNvPr id="2" name="図 1"/>
+          <p:cNvPicPr>
+            <a:picLocks noChangeAspect="1"/>
+          </p:cNvPicPr>
+          <p:nvPr/>
+        </p:nvPicPr>
+        <p:blipFill>
+          <a:blip r:embed="rId2"/>
+          <a:stretch>
+            <a:fillRect/>
+          </a:stretch>
+        </p:blipFill>
+        <p:spPr>
+          <a:xfrm>
+            <a:off x="1395412" y="1971675"/>
+            <a:ext cx="6353175" cy="2914650"/>
+          </a:xfrm>
+          <a:prstGeom prst="rect">
+            <a:avLst/>
+          </a:prstGeom>
+        </p:spPr>
+      </p:pic>
+    </p:spTree>
+    <p:extLst>
+      <p:ext uri="{BB962C8B-B14F-4D97-AF65-F5344CB8AC3E}">
+        <p14:creationId xmlns:p14="http://schemas.microsoft.com/office/powerpoint/2010/main" val="1041238217"/>
+      </p:ext>
+    </p:extLst>
+  </p:cSld>
+  <p:clrMapOvr>
+    <a:masterClrMapping/>
+  </p:clrMapOvr>
+</p:sld>
+</file>
+
+<file path=ppt/slides/slide9.xml><?xml version="1.0" encoding="utf-8"?>
+<p:sld xmlns:a="http://schemas.openxmlformats.org/drawingml/2006/main" xmlns:r="http://schemas.openxmlformats.org/officeDocument/2006/relationships" xmlns:p="http://schemas.openxmlformats.org/presentationml/2006/main">
+  <p:cSld>
+    <p:spTree>
+      <p:nvGrpSpPr>
+        <p:cNvPr id="1" name=""/>
+        <p:cNvGrpSpPr/>
+        <p:nvPr/>
+      </p:nvGrpSpPr>
+      <p:grpSpPr>
+        <a:xfrm>
+          <a:off x="0" y="0"/>
+          <a:ext cx="0" cy="0"/>
+          <a:chOff x="0" y="0"/>
+          <a:chExt cx="0" cy="0"/>
+        </a:xfrm>
+      </p:grpSpPr>
+      <p:pic>
+        <p:nvPicPr>
+          <p:cNvPr id="2" name="図 1"/>
+          <p:cNvPicPr>
+            <a:picLocks noChangeAspect="1"/>
+          </p:cNvPicPr>
+          <p:nvPr/>
+        </p:nvPicPr>
+        <p:blipFill>
+          <a:blip r:embed="rId2"/>
+          <a:stretch>
+            <a:fillRect/>
+          </a:stretch>
+        </p:blipFill>
+        <p:spPr>
+          <a:xfrm>
+            <a:off x="1562100" y="1366837"/>
+            <a:ext cx="6019800" cy="4124325"/>
+          </a:xfrm>
+          <a:prstGeom prst="rect">
+            <a:avLst/>
+          </a:prstGeom>
+        </p:spPr>
+      </p:pic>
+    </p:spTree>
+    <p:extLst>
+      <p:ext uri="{BB962C8B-B14F-4D97-AF65-F5344CB8AC3E}">
+        <p14:creationId xmlns:p14="http://schemas.microsoft.com/office/powerpoint/2010/main" val="1709633554"/>
+      </p:ext>
+    </p:extLst>
+  </p:cSld>
+  <p:clrMapOvr>
+    <a:masterClrMapping/>
+  </p:clrMapOvr>
+</p:sld>
+</file>
+
 <file path=ppt/theme/theme1.xml><?xml version="1.0" encoding="utf-8"?>
 <a:theme xmlns:a="http://schemas.openxmlformats.org/drawingml/2006/main" name="Office テーマ">
   <a:themeElements>

</xml_diff>

<commit_message>
write chapter 13:revert to BASE
</commit_message>
<xml_diff>
--- a/pptx/chapter-13.pptx
+++ b/pptx/chapter-13.pptx
@@ -14,6 +14,7 @@
     <p:sldId id="267" r:id="rId8"/>
     <p:sldId id="268" r:id="rId9"/>
     <p:sldId id="269" r:id="rId10"/>
+    <p:sldId id="270" r:id="rId11"/>
   </p:sldIdLst>
   <p:sldSz cx="9144000" cy="6858000" type="screen4x3"/>
   <p:notesSz cx="6858000" cy="9144000"/>
@@ -3850,6 +3851,60 @@
 </p:sld>
 </file>
 
+<file path=ppt/slides/slide10.xml><?xml version="1.0" encoding="utf-8"?>
+<p:sld xmlns:a="http://schemas.openxmlformats.org/drawingml/2006/main" xmlns:r="http://schemas.openxmlformats.org/officeDocument/2006/relationships" xmlns:p="http://schemas.openxmlformats.org/presentationml/2006/main">
+  <p:cSld>
+    <p:spTree>
+      <p:nvGrpSpPr>
+        <p:cNvPr id="1" name=""/>
+        <p:cNvGrpSpPr/>
+        <p:nvPr/>
+      </p:nvGrpSpPr>
+      <p:grpSpPr>
+        <a:xfrm>
+          <a:off x="0" y="0"/>
+          <a:ext cx="0" cy="0"/>
+          <a:chOff x="0" y="0"/>
+          <a:chExt cx="0" cy="0"/>
+        </a:xfrm>
+      </p:grpSpPr>
+      <p:pic>
+        <p:nvPicPr>
+          <p:cNvPr id="2" name="図 1"/>
+          <p:cNvPicPr>
+            <a:picLocks noChangeAspect="1"/>
+          </p:cNvPicPr>
+          <p:nvPr/>
+        </p:nvPicPr>
+        <p:blipFill>
+          <a:blip r:embed="rId2"/>
+          <a:stretch>
+            <a:fillRect/>
+          </a:stretch>
+        </p:blipFill>
+        <p:spPr>
+          <a:xfrm>
+            <a:off x="1738666" y="1905190"/>
+            <a:ext cx="5666667" cy="3047619"/>
+          </a:xfrm>
+          <a:prstGeom prst="rect">
+            <a:avLst/>
+          </a:prstGeom>
+        </p:spPr>
+      </p:pic>
+    </p:spTree>
+    <p:extLst>
+      <p:ext uri="{BB962C8B-B14F-4D97-AF65-F5344CB8AC3E}">
+        <p14:creationId xmlns:p14="http://schemas.microsoft.com/office/powerpoint/2010/main" val="1724834180"/>
+      </p:ext>
+    </p:extLst>
+  </p:cSld>
+  <p:clrMapOvr>
+    <a:masterClrMapping/>
+  </p:clrMapOvr>
+</p:sld>
+</file>
+
 <file path=ppt/slides/slide2.xml><?xml version="1.0" encoding="utf-8"?>
 <p:sld xmlns:a="http://schemas.openxmlformats.org/drawingml/2006/main" xmlns:r="http://schemas.openxmlformats.org/officeDocument/2006/relationships" xmlns:p="http://schemas.openxmlformats.org/presentationml/2006/main">
   <p:cSld>

</xml_diff>